<commit_message>
Addition Powerpoint slides and correcting report
</commit_message>
<xml_diff>
--- a/AutoInsurtech_Adobati_Basigalup_Colombo_Costanzi_Utke.pptx
+++ b/AutoInsurtech_Adobati_Basigalup_Colombo_Costanzi_Utke.pptx
@@ -118,6 +118,11 @@
       </a:defRPr>
     </a:lvl9pPr>
   </p:defaultTextStyle>
+  <p:extLst>
+    <p:ext uri="{EFAFB233-063F-42B5-8137-9DF3F51BA10A}">
+      <p15:sldGuideLst xmlns:p15="http://schemas.microsoft.com/office/powerpoint/2012/main"/>
+    </p:ext>
+  </p:extLst>
 </p:presentation>
 </file>
 
@@ -359,7 +364,7 @@
           <a:p>
             <a:fld id="{ED291B17-9318-49DB-B28B-6E5994AE9581}" type="datetime1">
               <a:rPr lang="en-US" smtClean="0"/>
-              <a:t>12/12/2019</a:t>
+              <a:t>12/13/19</a:t>
             </a:fld>
             <a:endParaRPr lang="en-US" dirty="0"/>
           </a:p>
@@ -562,7 +567,7 @@
           <a:p>
             <a:fld id="{2CED4963-E985-44C4-B8C4-FDD613B7C2F8}" type="datetime1">
               <a:rPr lang="en-US" smtClean="0"/>
-              <a:t>12/12/2019</a:t>
+              <a:t>12/13/19</a:t>
             </a:fld>
             <a:endParaRPr lang="en-US" dirty="0"/>
           </a:p>
@@ -924,7 +929,7 @@
           <a:p>
             <a:fld id="{ED291B17-9318-49DB-B28B-6E5994AE9581}" type="datetime1">
               <a:rPr lang="en-US" smtClean="0"/>
-              <a:t>12/12/2019</a:t>
+              <a:t>12/13/19</a:t>
             </a:fld>
             <a:endParaRPr lang="en-US" dirty="0"/>
           </a:p>
@@ -1122,7 +1127,7 @@
           <a:p>
             <a:fld id="{78DD82B9-B8EE-4375-B6FF-88FA6ABB15D9}" type="datetime1">
               <a:rPr lang="en-US" smtClean="0"/>
-              <a:t>12/12/2019</a:t>
+              <a:t>12/13/19</a:t>
             </a:fld>
             <a:endParaRPr lang="en-US" dirty="0"/>
           </a:p>
@@ -1434,7 +1439,7 @@
           <a:p>
             <a:fld id="{B2497495-0637-405E-AE64-5CC7506D51F5}" type="datetime1">
               <a:rPr lang="en-US" smtClean="0"/>
-              <a:t>12/12/2019</a:t>
+              <a:t>12/13/19</a:t>
             </a:fld>
             <a:endParaRPr lang="en-US" dirty="0"/>
           </a:p>
@@ -1687,7 +1692,7 @@
           <a:p>
             <a:fld id="{7BFFD690-9426-415D-8B65-26881E07B2D4}" type="datetime1">
               <a:rPr lang="en-US" smtClean="0"/>
-              <a:t>12/12/2019</a:t>
+              <a:t>12/13/19</a:t>
             </a:fld>
             <a:endParaRPr lang="en-US" dirty="0"/>
           </a:p>
@@ -2109,7 +2114,7 @@
           <a:p>
             <a:fld id="{04C4989A-474C-40DE-95B9-011C28B71673}" type="datetime1">
               <a:rPr lang="en-US" smtClean="0"/>
-              <a:t>12/12/2019</a:t>
+              <a:t>12/13/19</a:t>
             </a:fld>
             <a:endParaRPr lang="en-US" dirty="0"/>
           </a:p>
@@ -2232,7 +2237,7 @@
           <a:p>
             <a:fld id="{5DB4ED54-5B5E-4A04-93D3-5772E3CE3818}" type="datetime1">
               <a:rPr lang="en-US" smtClean="0"/>
-              <a:t>12/12/2019</a:t>
+              <a:t>12/13/19</a:t>
             </a:fld>
             <a:endParaRPr lang="en-US" dirty="0"/>
           </a:p>
@@ -2327,7 +2332,7 @@
           <a:p>
             <a:fld id="{4EDE50D6-574B-40AF-946F-D52A04ADE379}" type="datetime1">
               <a:rPr lang="en-US" smtClean="0"/>
-              <a:t>12/12/2019</a:t>
+              <a:t>12/13/19</a:t>
             </a:fld>
             <a:endParaRPr lang="en-US" dirty="0"/>
           </a:p>
@@ -2704,7 +2709,7 @@
           <a:p>
             <a:fld id="{D82884F1-FFEA-405F-9602-3DCA865EDA4E}" type="datetime1">
               <a:rPr lang="en-US" smtClean="0"/>
-              <a:t>12/12/2019</a:t>
+              <a:t>12/13/19</a:t>
             </a:fld>
             <a:endParaRPr lang="en-US" dirty="0"/>
           </a:p>
@@ -2997,7 +3002,7 @@
           <a:p>
             <a:fld id="{7E18DB4A-8810-4A10-AD5C-D5E2C667F5B3}" type="datetime1">
               <a:rPr lang="en-US" smtClean="0"/>
-              <a:t>12/12/2019</a:t>
+              <a:t>12/13/19</a:t>
             </a:fld>
             <a:endParaRPr lang="en-US" dirty="0"/>
           </a:p>
@@ -3212,7 +3217,7 @@
           <a:p>
             <a:fld id="{ED291B17-9318-49DB-B28B-6E5994AE9581}" type="datetime1">
               <a:rPr lang="en-US" smtClean="0"/>
-              <a:t>12/12/2019</a:t>
+              <a:t>12/13/19</a:t>
             </a:fld>
             <a:endParaRPr lang="en-US" dirty="0"/>
           </a:p>
@@ -5131,8 +5136,12 @@
           <a:lstStyle/>
           <a:p>
             <a:r>
+              <a:rPr lang="en-US" dirty="0" err="1"/>
+              <a:t>CarINSURANCE</a:t>
+            </a:r>
+            <a:r>
               <a:rPr lang="en-US" dirty="0"/>
-              <a:t>AUTO INSURANCE AS WE KNOW IT</a:t>
+              <a:t> AS WE KNOW IT</a:t>
             </a:r>
           </a:p>
         </p:txBody>
@@ -5155,10 +5164,891 @@
         </p:nvSpPr>
         <p:spPr/>
         <p:txBody>
-          <a:bodyPr/>
+          <a:bodyPr>
+            <a:normAutofit/>
+          </a:bodyPr>
           <a:lstStyle/>
           <a:p>
-            <a:endParaRPr lang="en-US"/>
+            <a:r>
+              <a:rPr lang="de-DE" dirty="0"/>
+              <a:t>The </a:t>
+            </a:r>
+            <a:r>
+              <a:rPr lang="de-DE" dirty="0" err="1"/>
+              <a:t>current</a:t>
+            </a:r>
+            <a:r>
+              <a:rPr lang="de-DE" dirty="0"/>
+              <a:t> </a:t>
+            </a:r>
+            <a:r>
+              <a:rPr lang="de-DE" dirty="0" err="1"/>
+              <a:t>insurance</a:t>
+            </a:r>
+            <a:r>
+              <a:rPr lang="de-DE" dirty="0"/>
+              <a:t> </a:t>
+            </a:r>
+            <a:r>
+              <a:rPr lang="de-DE" dirty="0" err="1"/>
+              <a:t>market</a:t>
+            </a:r>
+            <a:r>
+              <a:rPr lang="de-DE" dirty="0"/>
+              <a:t> </a:t>
+            </a:r>
+            <a:r>
+              <a:rPr lang="de-DE" dirty="0" err="1"/>
+              <a:t>presents</a:t>
+            </a:r>
+            <a:r>
+              <a:rPr lang="de-DE" dirty="0"/>
+              <a:t> </a:t>
+            </a:r>
+            <a:r>
+              <a:rPr lang="de-DE" dirty="0" err="1"/>
+              <a:t>many</a:t>
+            </a:r>
+            <a:r>
+              <a:rPr lang="de-DE" dirty="0"/>
+              <a:t> negative </a:t>
+            </a:r>
+            <a:r>
+              <a:rPr lang="de-DE" dirty="0" err="1"/>
+              <a:t>and</a:t>
+            </a:r>
+            <a:r>
+              <a:rPr lang="de-DE" dirty="0"/>
+              <a:t> </a:t>
+            </a:r>
+            <a:r>
+              <a:rPr lang="de-DE" dirty="0" err="1"/>
+              <a:t>controversial</a:t>
+            </a:r>
+            <a:r>
+              <a:rPr lang="de-DE" dirty="0"/>
+              <a:t> </a:t>
+            </a:r>
+            <a:r>
+              <a:rPr lang="de-DE" dirty="0" err="1"/>
+              <a:t>aspects</a:t>
+            </a:r>
+            <a:r>
+              <a:rPr lang="de-DE" dirty="0"/>
+              <a:t> </a:t>
+            </a:r>
+            <a:r>
+              <a:rPr lang="de-DE" dirty="0" err="1"/>
+              <a:t>that</a:t>
+            </a:r>
+            <a:r>
+              <a:rPr lang="de-DE" dirty="0"/>
+              <a:t> </a:t>
+            </a:r>
+            <a:r>
+              <a:rPr lang="de-DE" dirty="0" err="1"/>
+              <a:t>lead</a:t>
+            </a:r>
+            <a:r>
+              <a:rPr lang="de-DE" dirty="0"/>
+              <a:t> </a:t>
+            </a:r>
+            <a:r>
+              <a:rPr lang="de-DE" dirty="0" err="1"/>
+              <a:t>to</a:t>
+            </a:r>
+            <a:r>
+              <a:rPr lang="de-DE" dirty="0"/>
+              <a:t> </a:t>
+            </a:r>
+            <a:r>
+              <a:rPr lang="de-DE" dirty="0" err="1"/>
+              <a:t>customer</a:t>
+            </a:r>
+            <a:r>
+              <a:rPr lang="de-DE" dirty="0"/>
+              <a:t> </a:t>
+            </a:r>
+            <a:r>
+              <a:rPr lang="de-DE" dirty="0" err="1"/>
+              <a:t>dissatisfaction</a:t>
+            </a:r>
+            <a:r>
+              <a:rPr lang="de-DE" dirty="0"/>
+              <a:t>. </a:t>
+            </a:r>
+            <a:r>
+              <a:rPr lang="de-DE" dirty="0" err="1"/>
+              <a:t>To</a:t>
+            </a:r>
+            <a:r>
+              <a:rPr lang="de-DE" dirty="0"/>
+              <a:t> </a:t>
+            </a:r>
+            <a:r>
+              <a:rPr lang="de-DE" dirty="0" err="1"/>
+              <a:t>mention</a:t>
+            </a:r>
+            <a:r>
+              <a:rPr lang="de-DE" dirty="0"/>
+              <a:t> </a:t>
+            </a:r>
+            <a:r>
+              <a:rPr lang="de-DE" dirty="0" err="1"/>
+              <a:t>some</a:t>
+            </a:r>
+            <a:r>
+              <a:rPr lang="de-DE" dirty="0"/>
+              <a:t> </a:t>
+            </a:r>
+            <a:r>
+              <a:rPr lang="de-DE" dirty="0" err="1"/>
+              <a:t>problems</a:t>
+            </a:r>
+            <a:r>
+              <a:rPr lang="de-DE" dirty="0"/>
+              <a:t>, </a:t>
+            </a:r>
+            <a:r>
+              <a:rPr lang="de-DE" dirty="0" err="1"/>
+              <a:t>the</a:t>
+            </a:r>
+            <a:r>
+              <a:rPr lang="de-DE" dirty="0"/>
+              <a:t> </a:t>
+            </a:r>
+            <a:r>
+              <a:rPr lang="de-DE" dirty="0" err="1"/>
+              <a:t>price</a:t>
+            </a:r>
+            <a:r>
+              <a:rPr lang="de-DE" dirty="0"/>
+              <a:t> </a:t>
+            </a:r>
+            <a:r>
+              <a:rPr lang="de-DE" dirty="0" err="1"/>
+              <a:t>of</a:t>
+            </a:r>
+            <a:r>
+              <a:rPr lang="de-DE" dirty="0"/>
+              <a:t> a </a:t>
+            </a:r>
+            <a:r>
+              <a:rPr lang="de-DE" dirty="0" err="1"/>
+              <a:t>car</a:t>
+            </a:r>
+            <a:r>
+              <a:rPr lang="de-DE" dirty="0"/>
+              <a:t> </a:t>
+            </a:r>
+            <a:r>
+              <a:rPr lang="de-DE" dirty="0" err="1"/>
+              <a:t>insurance</a:t>
+            </a:r>
+            <a:r>
+              <a:rPr lang="de-DE" dirty="0"/>
+              <a:t> </a:t>
+            </a:r>
+            <a:r>
+              <a:rPr lang="de-DE" dirty="0" err="1"/>
+              <a:t>may</a:t>
+            </a:r>
+            <a:r>
+              <a:rPr lang="de-DE" dirty="0"/>
+              <a:t> </a:t>
+            </a:r>
+            <a:r>
+              <a:rPr lang="de-DE" dirty="0" err="1"/>
+              <a:t>vary</a:t>
+            </a:r>
+            <a:r>
+              <a:rPr lang="de-DE" dirty="0"/>
+              <a:t> a </a:t>
+            </a:r>
+            <a:r>
+              <a:rPr lang="de-DE" dirty="0" err="1"/>
+              <a:t>lot</a:t>
+            </a:r>
+            <a:r>
+              <a:rPr lang="de-DE" dirty="0"/>
+              <a:t> </a:t>
+            </a:r>
+            <a:r>
+              <a:rPr lang="de-DE" dirty="0" err="1"/>
+              <a:t>depending</a:t>
+            </a:r>
+            <a:r>
+              <a:rPr lang="de-DE" dirty="0"/>
+              <a:t> on </a:t>
+            </a:r>
+            <a:r>
+              <a:rPr lang="de-DE" dirty="0" err="1"/>
+              <a:t>several</a:t>
+            </a:r>
+            <a:r>
+              <a:rPr lang="de-DE" dirty="0"/>
+              <a:t> </a:t>
+            </a:r>
+            <a:r>
+              <a:rPr lang="de-DE" dirty="0" err="1"/>
+              <a:t>factors</a:t>
+            </a:r>
+            <a:r>
+              <a:rPr lang="de-DE" dirty="0"/>
+              <a:t>. </a:t>
+            </a:r>
+            <a:r>
+              <a:rPr lang="de-DE" dirty="0" err="1"/>
+              <a:t>Considering</a:t>
+            </a:r>
+            <a:r>
+              <a:rPr lang="de-DE" dirty="0"/>
+              <a:t> </a:t>
+            </a:r>
+            <a:r>
+              <a:rPr lang="de-DE" dirty="0" err="1"/>
+              <a:t>the</a:t>
+            </a:r>
+            <a:r>
+              <a:rPr lang="de-DE" dirty="0"/>
+              <a:t> </a:t>
+            </a:r>
+            <a:r>
+              <a:rPr lang="de-DE" dirty="0" err="1"/>
+              <a:t>fact</a:t>
+            </a:r>
+            <a:r>
+              <a:rPr lang="de-DE" dirty="0"/>
+              <a:t> </a:t>
+            </a:r>
+            <a:r>
+              <a:rPr lang="de-DE" dirty="0" err="1"/>
+              <a:t>that</a:t>
+            </a:r>
+            <a:r>
+              <a:rPr lang="de-DE" dirty="0"/>
+              <a:t> </a:t>
+            </a:r>
+            <a:r>
+              <a:rPr lang="de-DE" dirty="0" err="1"/>
+              <a:t>the</a:t>
+            </a:r>
+            <a:r>
+              <a:rPr lang="de-DE" dirty="0"/>
+              <a:t> </a:t>
+            </a:r>
+            <a:r>
+              <a:rPr lang="de-DE" dirty="0" err="1"/>
+              <a:t>user</a:t>
+            </a:r>
+            <a:r>
+              <a:rPr lang="de-DE" dirty="0"/>
+              <a:t> </a:t>
+            </a:r>
+            <a:r>
+              <a:rPr lang="de-DE" dirty="0" err="1"/>
+              <a:t>does</a:t>
+            </a:r>
+            <a:r>
+              <a:rPr lang="de-DE" dirty="0"/>
+              <a:t> not </a:t>
+            </a:r>
+            <a:r>
+              <a:rPr lang="de-DE" dirty="0" err="1"/>
+              <a:t>perceive</a:t>
+            </a:r>
+            <a:r>
+              <a:rPr lang="de-DE" dirty="0"/>
+              <a:t> a </a:t>
+            </a:r>
+            <a:r>
+              <a:rPr lang="de-DE" dirty="0" err="1"/>
+              <a:t>tangible</a:t>
+            </a:r>
+            <a:r>
+              <a:rPr lang="de-DE" dirty="0"/>
+              <a:t> </a:t>
+            </a:r>
+            <a:r>
+              <a:rPr lang="de-DE" dirty="0" err="1"/>
+              <a:t>value</a:t>
+            </a:r>
+            <a:r>
+              <a:rPr lang="de-DE" dirty="0"/>
+              <a:t> </a:t>
+            </a:r>
+            <a:r>
+              <a:rPr lang="de-DE" dirty="0" err="1"/>
+              <a:t>or</a:t>
+            </a:r>
+            <a:r>
+              <a:rPr lang="de-DE" dirty="0"/>
+              <a:t> a real </a:t>
+            </a:r>
+            <a:r>
+              <a:rPr lang="de-DE" dirty="0" err="1"/>
+              <a:t>experience</a:t>
+            </a:r>
+            <a:r>
+              <a:rPr lang="de-DE" dirty="0"/>
+              <a:t> </a:t>
+            </a:r>
+            <a:r>
+              <a:rPr lang="de-DE" dirty="0" err="1"/>
+              <a:t>from</a:t>
+            </a:r>
+            <a:r>
+              <a:rPr lang="de-DE" dirty="0"/>
+              <a:t> a </a:t>
+            </a:r>
+            <a:r>
+              <a:rPr lang="de-DE" dirty="0" err="1"/>
+              <a:t>car</a:t>
+            </a:r>
+            <a:r>
+              <a:rPr lang="de-DE" dirty="0"/>
+              <a:t> </a:t>
+            </a:r>
+            <a:r>
+              <a:rPr lang="de-DE" dirty="0" err="1"/>
+              <a:t>insurance</a:t>
+            </a:r>
+            <a:r>
+              <a:rPr lang="de-DE" dirty="0"/>
+              <a:t>, </a:t>
+            </a:r>
+            <a:r>
+              <a:rPr lang="de-DE" dirty="0" err="1"/>
+              <a:t>it</a:t>
+            </a:r>
+            <a:r>
+              <a:rPr lang="de-DE" dirty="0"/>
+              <a:t> </a:t>
+            </a:r>
+            <a:r>
+              <a:rPr lang="de-DE" dirty="0" err="1"/>
+              <a:t>can</a:t>
+            </a:r>
+            <a:r>
+              <a:rPr lang="de-DE" dirty="0"/>
+              <a:t> </a:t>
+            </a:r>
+            <a:r>
+              <a:rPr lang="de-DE" dirty="0" err="1"/>
+              <a:t>be</a:t>
+            </a:r>
+            <a:r>
+              <a:rPr lang="de-DE" dirty="0"/>
+              <a:t> </a:t>
+            </a:r>
+            <a:r>
+              <a:rPr lang="de-DE" dirty="0" err="1"/>
+              <a:t>perceived</a:t>
+            </a:r>
+            <a:r>
+              <a:rPr lang="de-DE" dirty="0"/>
+              <a:t> </a:t>
+            </a:r>
+            <a:r>
+              <a:rPr lang="de-DE" dirty="0" err="1"/>
+              <a:t>as</a:t>
+            </a:r>
+            <a:r>
+              <a:rPr lang="de-DE" dirty="0"/>
+              <a:t> </a:t>
+            </a:r>
+            <a:r>
+              <a:rPr lang="de-DE" dirty="0" err="1"/>
+              <a:t>quite</a:t>
+            </a:r>
+            <a:r>
+              <a:rPr lang="de-DE" dirty="0"/>
+              <a:t> expensive.</a:t>
+            </a:r>
+          </a:p>
+          <a:p>
+            <a:r>
+              <a:rPr lang="de-DE" dirty="0"/>
+              <a:t>The </a:t>
+            </a:r>
+            <a:r>
+              <a:rPr lang="de-DE" dirty="0" err="1"/>
+              <a:t>process</a:t>
+            </a:r>
+            <a:r>
+              <a:rPr lang="de-DE" dirty="0"/>
+              <a:t> </a:t>
+            </a:r>
+            <a:r>
+              <a:rPr lang="de-DE" dirty="0" err="1"/>
+              <a:t>and</a:t>
+            </a:r>
+            <a:r>
+              <a:rPr lang="de-DE" dirty="0"/>
+              <a:t> </a:t>
+            </a:r>
+            <a:r>
+              <a:rPr lang="de-DE" dirty="0" err="1"/>
+              <a:t>the</a:t>
+            </a:r>
+            <a:r>
+              <a:rPr lang="de-DE" dirty="0"/>
+              <a:t> </a:t>
+            </a:r>
+            <a:r>
+              <a:rPr lang="de-DE" dirty="0" err="1"/>
+              <a:t>contracts</a:t>
+            </a:r>
+            <a:r>
+              <a:rPr lang="de-DE" dirty="0"/>
+              <a:t> </a:t>
+            </a:r>
+            <a:r>
+              <a:rPr lang="de-DE" dirty="0" err="1"/>
+              <a:t>themselves</a:t>
+            </a:r>
+            <a:r>
+              <a:rPr lang="de-DE" dirty="0"/>
+              <a:t> </a:t>
+            </a:r>
+            <a:r>
+              <a:rPr lang="de-DE" dirty="0" err="1"/>
+              <a:t>can</a:t>
+            </a:r>
+            <a:r>
+              <a:rPr lang="de-DE" dirty="0"/>
+              <a:t> </a:t>
+            </a:r>
+            <a:r>
+              <a:rPr lang="de-DE" dirty="0" err="1"/>
+              <a:t>be</a:t>
+            </a:r>
+            <a:r>
+              <a:rPr lang="de-DE" dirty="0"/>
+              <a:t> </a:t>
+            </a:r>
+            <a:r>
+              <a:rPr lang="de-DE" dirty="0" err="1"/>
+              <a:t>highly</a:t>
+            </a:r>
+            <a:r>
+              <a:rPr lang="de-DE" dirty="0"/>
+              <a:t> </a:t>
+            </a:r>
+            <a:r>
+              <a:rPr lang="de-DE" dirty="0" err="1"/>
+              <a:t>complex</a:t>
+            </a:r>
+            <a:r>
+              <a:rPr lang="de-DE" dirty="0"/>
+              <a:t> </a:t>
+            </a:r>
+            <a:r>
+              <a:rPr lang="de-DE" dirty="0" err="1"/>
+              <a:t>and</a:t>
+            </a:r>
+            <a:r>
+              <a:rPr lang="de-DE" dirty="0"/>
+              <a:t> </a:t>
+            </a:r>
+            <a:r>
+              <a:rPr lang="de-DE" dirty="0" err="1"/>
+              <a:t>far</a:t>
+            </a:r>
+            <a:r>
+              <a:rPr lang="de-DE" dirty="0"/>
+              <a:t> </a:t>
+            </a:r>
+            <a:r>
+              <a:rPr lang="de-DE" dirty="0" err="1"/>
+              <a:t>away</a:t>
+            </a:r>
+            <a:r>
+              <a:rPr lang="de-DE" dirty="0"/>
+              <a:t> </a:t>
+            </a:r>
+            <a:r>
+              <a:rPr lang="de-DE" dirty="0" err="1"/>
+              <a:t>from</a:t>
+            </a:r>
+            <a:r>
+              <a:rPr lang="de-DE" dirty="0"/>
+              <a:t> a user-</a:t>
+            </a:r>
+            <a:r>
+              <a:rPr lang="de-DE" dirty="0" err="1"/>
+              <a:t>friendly</a:t>
+            </a:r>
+            <a:r>
+              <a:rPr lang="de-DE" dirty="0"/>
+              <a:t> </a:t>
+            </a:r>
+            <a:r>
+              <a:rPr lang="de-DE" dirty="0" err="1"/>
+              <a:t>experience</a:t>
+            </a:r>
+            <a:r>
+              <a:rPr lang="de-DE" dirty="0"/>
+              <a:t>. </a:t>
+            </a:r>
+          </a:p>
+          <a:p>
+            <a:r>
+              <a:rPr lang="de-DE" dirty="0"/>
+              <a:t>Insurance </a:t>
+            </a:r>
+            <a:r>
+              <a:rPr lang="de-DE" dirty="0" err="1"/>
+              <a:t>companies</a:t>
+            </a:r>
+            <a:r>
+              <a:rPr lang="de-DE" dirty="0"/>
+              <a:t> </a:t>
+            </a:r>
+            <a:r>
+              <a:rPr lang="de-DE" dirty="0" err="1"/>
+              <a:t>are</a:t>
+            </a:r>
+            <a:r>
+              <a:rPr lang="de-DE" dirty="0"/>
+              <a:t> </a:t>
+            </a:r>
+            <a:r>
+              <a:rPr lang="de-DE" dirty="0" err="1"/>
+              <a:t>abled</a:t>
+            </a:r>
+            <a:r>
+              <a:rPr lang="de-DE" dirty="0"/>
+              <a:t> </a:t>
+            </a:r>
+            <a:r>
+              <a:rPr lang="de-DE" dirty="0" err="1"/>
+              <a:t>to</a:t>
+            </a:r>
+            <a:r>
+              <a:rPr lang="de-DE" dirty="0"/>
+              <a:t> </a:t>
+            </a:r>
+            <a:r>
+              <a:rPr lang="de-DE" dirty="0" err="1"/>
+              <a:t>construct</a:t>
+            </a:r>
+            <a:r>
+              <a:rPr lang="de-DE" dirty="0"/>
+              <a:t> </a:t>
+            </a:r>
+            <a:r>
+              <a:rPr lang="de-DE" dirty="0" err="1"/>
+              <a:t>contracts</a:t>
+            </a:r>
+            <a:r>
+              <a:rPr lang="de-DE" dirty="0"/>
+              <a:t> </a:t>
+            </a:r>
+            <a:r>
+              <a:rPr lang="de-DE" dirty="0" err="1"/>
+              <a:t>that</a:t>
+            </a:r>
+            <a:r>
+              <a:rPr lang="de-DE" dirty="0"/>
+              <a:t> </a:t>
+            </a:r>
+            <a:r>
+              <a:rPr lang="de-DE" dirty="0" err="1"/>
+              <a:t>are</a:t>
+            </a:r>
+            <a:r>
+              <a:rPr lang="de-DE" dirty="0"/>
+              <a:t> </a:t>
+            </a:r>
+            <a:r>
+              <a:rPr lang="de-DE" dirty="0" err="1"/>
+              <a:t>favourable</a:t>
+            </a:r>
+            <a:r>
+              <a:rPr lang="de-DE" dirty="0"/>
+              <a:t> </a:t>
+            </a:r>
+            <a:r>
+              <a:rPr lang="de-DE" dirty="0" err="1"/>
+              <a:t>or</a:t>
+            </a:r>
+            <a:r>
+              <a:rPr lang="de-DE" dirty="0"/>
+              <a:t> </a:t>
+            </a:r>
+            <a:r>
+              <a:rPr lang="de-DE" dirty="0" err="1"/>
+              <a:t>them</a:t>
+            </a:r>
+            <a:r>
+              <a:rPr lang="de-DE" dirty="0"/>
+              <a:t>. </a:t>
+            </a:r>
+            <a:r>
+              <a:rPr lang="de-DE" dirty="0" err="1"/>
+              <a:t>Despite</a:t>
+            </a:r>
+            <a:r>
+              <a:rPr lang="de-DE" dirty="0"/>
+              <a:t> </a:t>
+            </a:r>
+            <a:r>
+              <a:rPr lang="de-DE" dirty="0" err="1"/>
+              <a:t>the</a:t>
+            </a:r>
+            <a:r>
+              <a:rPr lang="de-DE" dirty="0"/>
+              <a:t> </a:t>
+            </a:r>
+            <a:r>
+              <a:rPr lang="de-DE" dirty="0" err="1"/>
+              <a:t>fact</a:t>
+            </a:r>
+            <a:r>
+              <a:rPr lang="de-DE" dirty="0"/>
+              <a:t> </a:t>
+            </a:r>
+            <a:r>
+              <a:rPr lang="de-DE" dirty="0" err="1"/>
+              <a:t>that</a:t>
+            </a:r>
+            <a:r>
+              <a:rPr lang="de-DE" dirty="0"/>
+              <a:t> a </a:t>
+            </a:r>
+            <a:r>
+              <a:rPr lang="de-DE" dirty="0" err="1"/>
+              <a:t>car</a:t>
+            </a:r>
+            <a:r>
+              <a:rPr lang="de-DE" dirty="0"/>
+              <a:t> </a:t>
+            </a:r>
+            <a:r>
+              <a:rPr lang="de-DE" dirty="0" err="1"/>
+              <a:t>insurance</a:t>
+            </a:r>
+            <a:r>
+              <a:rPr lang="de-DE" dirty="0"/>
+              <a:t> </a:t>
+            </a:r>
+            <a:r>
+              <a:rPr lang="de-DE" dirty="0" err="1"/>
+              <a:t>can</a:t>
+            </a:r>
+            <a:r>
+              <a:rPr lang="de-DE" dirty="0"/>
+              <a:t> </a:t>
+            </a:r>
+            <a:r>
+              <a:rPr lang="de-DE" dirty="0" err="1"/>
+              <a:t>be</a:t>
+            </a:r>
+            <a:r>
+              <a:rPr lang="de-DE" dirty="0"/>
+              <a:t> </a:t>
+            </a:r>
+            <a:r>
+              <a:rPr lang="de-DE" dirty="0" err="1"/>
+              <a:t>very</a:t>
+            </a:r>
+            <a:r>
+              <a:rPr lang="de-DE" dirty="0"/>
+              <a:t> expensive, </a:t>
+            </a:r>
+            <a:r>
+              <a:rPr lang="de-DE" dirty="0" err="1"/>
+              <a:t>the</a:t>
+            </a:r>
+            <a:r>
+              <a:rPr lang="de-DE" dirty="0"/>
+              <a:t> </a:t>
+            </a:r>
+            <a:r>
+              <a:rPr lang="de-DE" dirty="0" err="1"/>
+              <a:t>chances</a:t>
+            </a:r>
+            <a:r>
+              <a:rPr lang="de-DE" dirty="0"/>
+              <a:t> </a:t>
+            </a:r>
+            <a:r>
+              <a:rPr lang="de-DE" dirty="0" err="1"/>
+              <a:t>of</a:t>
+            </a:r>
+            <a:r>
+              <a:rPr lang="de-DE" dirty="0"/>
+              <a:t> </a:t>
+            </a:r>
+            <a:r>
+              <a:rPr lang="de-DE" dirty="0" err="1"/>
+              <a:t>getting</a:t>
+            </a:r>
+            <a:r>
+              <a:rPr lang="de-DE" dirty="0"/>
+              <a:t> </a:t>
+            </a:r>
+            <a:r>
+              <a:rPr lang="de-DE" dirty="0" err="1"/>
+              <a:t>paid</a:t>
+            </a:r>
+            <a:r>
+              <a:rPr lang="de-DE" dirty="0"/>
+              <a:t> out </a:t>
+            </a:r>
+            <a:r>
+              <a:rPr lang="de-DE" dirty="0" err="1"/>
+              <a:t>by</a:t>
+            </a:r>
+            <a:r>
+              <a:rPr lang="de-DE" dirty="0"/>
+              <a:t> an </a:t>
+            </a:r>
+            <a:r>
+              <a:rPr lang="de-DE" dirty="0" err="1"/>
+              <a:t>insurance</a:t>
+            </a:r>
+            <a:r>
+              <a:rPr lang="de-DE" dirty="0"/>
+              <a:t> </a:t>
+            </a:r>
+            <a:r>
+              <a:rPr lang="de-DE" dirty="0" err="1"/>
+              <a:t>are</a:t>
+            </a:r>
+            <a:r>
+              <a:rPr lang="de-DE" dirty="0"/>
+              <a:t> at 5% </a:t>
+            </a:r>
+            <a:r>
+              <a:rPr lang="de-DE" dirty="0" err="1"/>
+              <a:t>and</a:t>
+            </a:r>
+            <a:r>
+              <a:rPr lang="de-DE" dirty="0"/>
+              <a:t> </a:t>
+            </a:r>
+            <a:r>
+              <a:rPr lang="de-DE" dirty="0" err="1"/>
+              <a:t>it</a:t>
+            </a:r>
+            <a:r>
+              <a:rPr lang="de-DE" dirty="0"/>
+              <a:t> </a:t>
+            </a:r>
+            <a:r>
+              <a:rPr lang="de-DE" dirty="0" err="1"/>
+              <a:t>is</a:t>
+            </a:r>
+            <a:r>
+              <a:rPr lang="de-DE" dirty="0"/>
+              <a:t> not </a:t>
+            </a:r>
+            <a:r>
+              <a:rPr lang="de-DE" dirty="0" err="1"/>
+              <a:t>even</a:t>
+            </a:r>
+            <a:r>
+              <a:rPr lang="de-DE" dirty="0"/>
+              <a:t> </a:t>
+            </a:r>
+            <a:r>
+              <a:rPr lang="de-DE" dirty="0" err="1"/>
+              <a:t>clear</a:t>
+            </a:r>
+            <a:r>
+              <a:rPr lang="de-DE" dirty="0"/>
+              <a:t> </a:t>
+            </a:r>
+            <a:r>
+              <a:rPr lang="de-DE" dirty="0" err="1"/>
+              <a:t>how</a:t>
+            </a:r>
+            <a:r>
+              <a:rPr lang="de-DE" dirty="0"/>
+              <a:t> </a:t>
+            </a:r>
+            <a:r>
+              <a:rPr lang="de-DE" dirty="0" err="1"/>
+              <a:t>much</a:t>
+            </a:r>
+            <a:r>
+              <a:rPr lang="de-DE" dirty="0"/>
+              <a:t> </a:t>
+            </a:r>
+            <a:r>
+              <a:rPr lang="de-DE" dirty="0" err="1"/>
+              <a:t>is</a:t>
+            </a:r>
+            <a:r>
+              <a:rPr lang="de-DE" dirty="0"/>
+              <a:t> </a:t>
+            </a:r>
+            <a:r>
+              <a:rPr lang="de-DE" dirty="0" err="1"/>
+              <a:t>covered</a:t>
+            </a:r>
+            <a:r>
+              <a:rPr lang="de-DE" dirty="0"/>
+              <a:t>. </a:t>
+            </a:r>
+            <a:r>
+              <a:rPr lang="de-DE" dirty="0" err="1"/>
+              <a:t>Moreover</a:t>
+            </a:r>
+            <a:r>
+              <a:rPr lang="de-DE" dirty="0"/>
+              <a:t>, just 60%-70% </a:t>
+            </a:r>
+            <a:r>
+              <a:rPr lang="de-DE" dirty="0" err="1"/>
+              <a:t>of</a:t>
+            </a:r>
+            <a:r>
+              <a:rPr lang="de-DE" dirty="0"/>
+              <a:t> </a:t>
+            </a:r>
+            <a:r>
+              <a:rPr lang="de-DE" dirty="0" err="1"/>
+              <a:t>premia</a:t>
+            </a:r>
+            <a:r>
+              <a:rPr lang="de-DE" dirty="0"/>
+              <a:t> </a:t>
+            </a:r>
+            <a:r>
+              <a:rPr lang="de-DE" dirty="0" err="1"/>
+              <a:t>are</a:t>
+            </a:r>
+            <a:r>
+              <a:rPr lang="de-DE" dirty="0"/>
+              <a:t> </a:t>
+            </a:r>
+            <a:r>
+              <a:rPr lang="de-DE" dirty="0" err="1"/>
+              <a:t>spent</a:t>
+            </a:r>
+            <a:r>
+              <a:rPr lang="de-DE" dirty="0"/>
+              <a:t> on </a:t>
+            </a:r>
+            <a:r>
+              <a:rPr lang="de-DE" dirty="0" err="1"/>
+              <a:t>damages</a:t>
+            </a:r>
+            <a:r>
+              <a:rPr lang="de-DE" dirty="0"/>
+              <a:t>.</a:t>
+            </a:r>
+            <a:r>
+              <a:rPr lang="de-DE"/>
+              <a:t> </a:t>
+            </a:r>
+            <a:endParaRPr lang="de-DE" dirty="0"/>
+          </a:p>
+          <a:p>
+            <a:endParaRPr lang="en-US" dirty="0"/>
           </a:p>
         </p:txBody>
       </p:sp>
@@ -5210,12 +6100,22 @@
         </p:nvSpPr>
         <p:spPr/>
         <p:txBody>
-          <a:bodyPr/>
+          <a:bodyPr>
+            <a:normAutofit fontScale="90000"/>
+          </a:bodyPr>
           <a:lstStyle/>
           <a:p>
             <a:r>
               <a:rPr lang="en-US" dirty="0"/>
-              <a:t>WHAT’S GOING ON IN THE INDUSTRY</a:t>
+              <a:t>WHAT’S GOING ON IN THE </a:t>
+            </a:r>
+            <a:r>
+              <a:rPr lang="en-US" dirty="0" err="1"/>
+              <a:t>Insurtech</a:t>
+            </a:r>
+            <a:r>
+              <a:rPr lang="en-US" dirty="0"/>
+              <a:t> INDUSTRY</a:t>
             </a:r>
           </a:p>
         </p:txBody>
@@ -5236,12 +6136,1510 @@
             <p:ph idx="1"/>
           </p:nvPr>
         </p:nvSpPr>
-        <p:spPr/>
-        <p:txBody>
-          <a:bodyPr/>
+        <p:spPr>
+          <a:xfrm>
+            <a:off x="581192" y="1890876"/>
+            <a:ext cx="11029615" cy="4084474"/>
+          </a:xfrm>
+        </p:spPr>
+        <p:txBody>
+          <a:bodyPr>
+            <a:normAutofit/>
+          </a:bodyPr>
           <a:lstStyle/>
           <a:p>
-            <a:endParaRPr lang="en-US"/>
+            <a:r>
+              <a:rPr lang="de-DE" dirty="0"/>
+              <a:t>Due </a:t>
+            </a:r>
+            <a:r>
+              <a:rPr lang="de-DE" dirty="0" err="1"/>
+              <a:t>to</a:t>
+            </a:r>
+            <a:r>
+              <a:rPr lang="de-DE" dirty="0"/>
+              <a:t> </a:t>
+            </a:r>
+            <a:r>
+              <a:rPr lang="de-DE" dirty="0" err="1"/>
+              <a:t>recent</a:t>
+            </a:r>
+            <a:r>
+              <a:rPr lang="de-DE" dirty="0"/>
+              <a:t> </a:t>
+            </a:r>
+            <a:r>
+              <a:rPr lang="de-DE" dirty="0" err="1"/>
+              <a:t>technological</a:t>
+            </a:r>
+            <a:r>
+              <a:rPr lang="de-DE" dirty="0"/>
+              <a:t> </a:t>
+            </a:r>
+            <a:r>
+              <a:rPr lang="de-DE" dirty="0" err="1"/>
+              <a:t>development</a:t>
+            </a:r>
+            <a:r>
+              <a:rPr lang="de-DE" dirty="0"/>
+              <a:t>, </a:t>
+            </a:r>
+            <a:r>
+              <a:rPr lang="de-DE" dirty="0" err="1"/>
+              <a:t>the</a:t>
+            </a:r>
+            <a:r>
+              <a:rPr lang="de-DE" dirty="0"/>
+              <a:t> </a:t>
+            </a:r>
+            <a:r>
+              <a:rPr lang="de-DE" dirty="0" err="1"/>
+              <a:t>insurance</a:t>
+            </a:r>
+            <a:r>
+              <a:rPr lang="de-DE" dirty="0"/>
+              <a:t> </a:t>
+            </a:r>
+            <a:r>
+              <a:rPr lang="de-DE" dirty="0" err="1"/>
+              <a:t>market</a:t>
+            </a:r>
+            <a:r>
+              <a:rPr lang="de-DE" dirty="0"/>
+              <a:t> falls </a:t>
+            </a:r>
+            <a:r>
+              <a:rPr lang="de-DE" dirty="0" err="1"/>
+              <a:t>under</a:t>
+            </a:r>
+            <a:r>
+              <a:rPr lang="de-DE" dirty="0"/>
+              <a:t> </a:t>
+            </a:r>
+            <a:r>
+              <a:rPr lang="de-DE" dirty="0" err="1"/>
+              <a:t>the</a:t>
+            </a:r>
+            <a:r>
+              <a:rPr lang="de-DE" dirty="0"/>
+              <a:t> </a:t>
+            </a:r>
+            <a:r>
+              <a:rPr lang="de-DE" dirty="0" err="1"/>
+              <a:t>radar</a:t>
+            </a:r>
+            <a:r>
+              <a:rPr lang="de-DE" dirty="0"/>
+              <a:t> </a:t>
+            </a:r>
+            <a:r>
+              <a:rPr lang="de-DE" dirty="0" err="1"/>
+              <a:t>for</a:t>
+            </a:r>
+            <a:r>
+              <a:rPr lang="de-DE" dirty="0"/>
+              <a:t> </a:t>
+            </a:r>
+            <a:r>
+              <a:rPr lang="de-DE" dirty="0" err="1"/>
+              <a:t>technological</a:t>
+            </a:r>
+            <a:r>
+              <a:rPr lang="de-DE" dirty="0"/>
+              <a:t> </a:t>
+            </a:r>
+            <a:r>
+              <a:rPr lang="de-DE" dirty="0" err="1"/>
+              <a:t>advancements</a:t>
+            </a:r>
+            <a:r>
+              <a:rPr lang="de-DE" dirty="0"/>
+              <a:t>. A </a:t>
+            </a:r>
+            <a:r>
+              <a:rPr lang="de-DE" dirty="0" err="1"/>
+              <a:t>recent</a:t>
+            </a:r>
+            <a:r>
+              <a:rPr lang="de-DE" dirty="0"/>
+              <a:t> </a:t>
+            </a:r>
+            <a:r>
+              <a:rPr lang="de-DE" dirty="0" err="1"/>
+              <a:t>report</a:t>
+            </a:r>
+            <a:r>
+              <a:rPr lang="de-DE" dirty="0"/>
+              <a:t> </a:t>
+            </a:r>
+            <a:r>
+              <a:rPr lang="de-DE" dirty="0" err="1"/>
+              <a:t>about</a:t>
+            </a:r>
+            <a:r>
+              <a:rPr lang="de-DE" dirty="0"/>
+              <a:t> </a:t>
+            </a:r>
+            <a:r>
+              <a:rPr lang="de-DE" dirty="0" err="1"/>
+              <a:t>the</a:t>
+            </a:r>
+            <a:r>
+              <a:rPr lang="de-DE" dirty="0"/>
+              <a:t> Global </a:t>
+            </a:r>
+            <a:r>
+              <a:rPr lang="de-DE" dirty="0" err="1"/>
+              <a:t>InsurTech</a:t>
+            </a:r>
+            <a:r>
+              <a:rPr lang="de-DE" dirty="0"/>
+              <a:t> </a:t>
+            </a:r>
+            <a:r>
+              <a:rPr lang="de-DE" dirty="0" err="1"/>
+              <a:t>market</a:t>
+            </a:r>
+            <a:r>
+              <a:rPr lang="de-DE" dirty="0"/>
+              <a:t> </a:t>
+            </a:r>
+            <a:r>
+              <a:rPr lang="de-DE" dirty="0" err="1"/>
+              <a:t>revealed</a:t>
+            </a:r>
+            <a:r>
+              <a:rPr lang="de-DE" dirty="0"/>
+              <a:t> </a:t>
+            </a:r>
+            <a:r>
+              <a:rPr lang="de-DE" dirty="0" err="1"/>
+              <a:t>that</a:t>
+            </a:r>
+            <a:r>
+              <a:rPr lang="de-DE" dirty="0"/>
+              <a:t> </a:t>
+            </a:r>
+            <a:r>
+              <a:rPr lang="de-DE" dirty="0" err="1"/>
+              <a:t>the</a:t>
+            </a:r>
+            <a:r>
+              <a:rPr lang="de-DE" dirty="0"/>
+              <a:t> </a:t>
+            </a:r>
+            <a:r>
+              <a:rPr lang="de-DE" dirty="0" err="1"/>
+              <a:t>market</a:t>
+            </a:r>
+            <a:r>
+              <a:rPr lang="de-DE" dirty="0"/>
+              <a:t> </a:t>
+            </a:r>
+            <a:r>
+              <a:rPr lang="de-DE" dirty="0" err="1"/>
+              <a:t>is</a:t>
+            </a:r>
+            <a:r>
+              <a:rPr lang="de-DE" dirty="0"/>
+              <a:t> </a:t>
+            </a:r>
+            <a:r>
+              <a:rPr lang="de-DE" dirty="0" err="1"/>
+              <a:t>expected</a:t>
+            </a:r>
+            <a:r>
+              <a:rPr lang="de-DE" dirty="0"/>
+              <a:t> </a:t>
+            </a:r>
+            <a:r>
+              <a:rPr lang="de-DE" dirty="0" err="1"/>
+              <a:t>to</a:t>
+            </a:r>
+            <a:r>
+              <a:rPr lang="de-DE" dirty="0"/>
+              <a:t> </a:t>
+            </a:r>
+            <a:r>
+              <a:rPr lang="de-DE" dirty="0" err="1"/>
+              <a:t>grow</a:t>
+            </a:r>
+            <a:r>
+              <a:rPr lang="de-DE" dirty="0"/>
+              <a:t> </a:t>
+            </a:r>
+            <a:r>
+              <a:rPr lang="de-DE" dirty="0" err="1"/>
+              <a:t>by</a:t>
+            </a:r>
+            <a:r>
+              <a:rPr lang="de-DE" dirty="0"/>
+              <a:t> 15.63 Billion </a:t>
+            </a:r>
+            <a:r>
+              <a:rPr lang="de-DE" dirty="0" err="1"/>
+              <a:t>from</a:t>
+            </a:r>
+            <a:r>
+              <a:rPr lang="de-DE" dirty="0"/>
+              <a:t> 2018 </a:t>
+            </a:r>
+            <a:r>
+              <a:rPr lang="de-DE" dirty="0" err="1"/>
+              <a:t>to</a:t>
+            </a:r>
+            <a:r>
+              <a:rPr lang="de-DE" dirty="0"/>
+              <a:t> 2023. This </a:t>
+            </a:r>
+            <a:r>
+              <a:rPr lang="de-DE" dirty="0" err="1"/>
+              <a:t>translates</a:t>
+            </a:r>
+            <a:r>
+              <a:rPr lang="de-DE" dirty="0"/>
+              <a:t> </a:t>
+            </a:r>
+            <a:r>
+              <a:rPr lang="de-DE" dirty="0" err="1"/>
+              <a:t>to</a:t>
+            </a:r>
+            <a:r>
+              <a:rPr lang="de-DE" dirty="0"/>
+              <a:t> an </a:t>
+            </a:r>
+            <a:r>
+              <a:rPr lang="de-DE" dirty="0" err="1"/>
+              <a:t>estimated</a:t>
+            </a:r>
+            <a:r>
+              <a:rPr lang="de-DE" dirty="0"/>
+              <a:t> </a:t>
+            </a:r>
+            <a:r>
+              <a:rPr lang="de-DE" dirty="0" err="1"/>
+              <a:t>year-over-year</a:t>
+            </a:r>
+            <a:r>
+              <a:rPr lang="de-DE" dirty="0"/>
+              <a:t> </a:t>
+            </a:r>
+            <a:r>
+              <a:rPr lang="de-DE" dirty="0" err="1"/>
+              <a:t>growth</a:t>
+            </a:r>
+            <a:r>
+              <a:rPr lang="de-DE" dirty="0"/>
+              <a:t> </a:t>
+            </a:r>
+            <a:r>
+              <a:rPr lang="de-DE" dirty="0" err="1"/>
+              <a:t>of</a:t>
+            </a:r>
+            <a:r>
+              <a:rPr lang="de-DE" dirty="0"/>
+              <a:t> </a:t>
+            </a:r>
+            <a:r>
+              <a:rPr lang="de-DE" dirty="0" err="1"/>
+              <a:t>more</a:t>
+            </a:r>
+            <a:r>
+              <a:rPr lang="de-DE" dirty="0"/>
+              <a:t> </a:t>
+            </a:r>
+            <a:r>
+              <a:rPr lang="de-DE" dirty="0" err="1"/>
+              <a:t>than</a:t>
+            </a:r>
+            <a:r>
+              <a:rPr lang="de-DE" dirty="0"/>
+              <a:t> 45% </a:t>
+            </a:r>
+            <a:r>
+              <a:rPr lang="de-DE" dirty="0" err="1"/>
+              <a:t>for</a:t>
+            </a:r>
+            <a:r>
+              <a:rPr lang="de-DE" dirty="0"/>
+              <a:t> 2019. *</a:t>
+            </a:r>
+            <a:r>
+              <a:rPr lang="de-DE" baseline="30000" dirty="0"/>
+              <a:t>3</a:t>
+            </a:r>
+            <a:endParaRPr lang="de-DE" dirty="0"/>
+          </a:p>
+          <a:p>
+            <a:r>
+              <a:rPr lang="de-DE" dirty="0" err="1"/>
+              <a:t>blockchain</a:t>
+            </a:r>
+            <a:r>
+              <a:rPr lang="de-DE" dirty="0"/>
+              <a:t> </a:t>
+            </a:r>
+            <a:r>
+              <a:rPr lang="de-DE" dirty="0" err="1"/>
+              <a:t>based</a:t>
+            </a:r>
+            <a:r>
+              <a:rPr lang="de-DE" dirty="0"/>
+              <a:t> </a:t>
+            </a:r>
+            <a:r>
+              <a:rPr lang="de-DE" dirty="0" err="1"/>
+              <a:t>technologies</a:t>
+            </a:r>
+            <a:r>
+              <a:rPr lang="de-DE" dirty="0"/>
+              <a:t> </a:t>
+            </a:r>
+            <a:r>
+              <a:rPr lang="de-DE" dirty="0" err="1"/>
+              <a:t>are</a:t>
+            </a:r>
+            <a:r>
+              <a:rPr lang="de-DE" dirty="0"/>
+              <a:t> </a:t>
+            </a:r>
+            <a:r>
+              <a:rPr lang="de-DE" dirty="0" err="1"/>
+              <a:t>seen</a:t>
+            </a:r>
+            <a:r>
+              <a:rPr lang="de-DE" dirty="0"/>
+              <a:t> </a:t>
+            </a:r>
+            <a:r>
+              <a:rPr lang="de-DE" dirty="0" err="1"/>
+              <a:t>as</a:t>
+            </a:r>
+            <a:r>
+              <a:rPr lang="de-DE" dirty="0"/>
+              <a:t> an </a:t>
+            </a:r>
+            <a:r>
+              <a:rPr lang="de-DE" dirty="0" err="1"/>
+              <a:t>approproiate</a:t>
+            </a:r>
+            <a:r>
+              <a:rPr lang="de-DE" dirty="0"/>
+              <a:t> </a:t>
+            </a:r>
+            <a:r>
+              <a:rPr lang="de-DE" dirty="0" err="1"/>
+              <a:t>solution</a:t>
+            </a:r>
+            <a:r>
+              <a:rPr lang="de-DE" dirty="0"/>
+              <a:t>, due </a:t>
+            </a:r>
+            <a:r>
+              <a:rPr lang="de-DE" dirty="0" err="1"/>
+              <a:t>to</a:t>
+            </a:r>
+            <a:r>
+              <a:rPr lang="de-DE" dirty="0"/>
+              <a:t> </a:t>
+            </a:r>
+            <a:r>
+              <a:rPr lang="de-DE" dirty="0" err="1"/>
+              <a:t>their</a:t>
+            </a:r>
+            <a:r>
+              <a:rPr lang="de-DE" dirty="0"/>
+              <a:t> </a:t>
+            </a:r>
+            <a:r>
+              <a:rPr lang="de-DE" dirty="0" err="1"/>
+              <a:t>immutability</a:t>
+            </a:r>
+            <a:r>
+              <a:rPr lang="de-DE" dirty="0"/>
+              <a:t> </a:t>
+            </a:r>
+            <a:r>
+              <a:rPr lang="de-DE" dirty="0" err="1"/>
+              <a:t>and</a:t>
+            </a:r>
+            <a:r>
+              <a:rPr lang="de-DE" dirty="0"/>
+              <a:t> </a:t>
+            </a:r>
+            <a:r>
+              <a:rPr lang="de-DE" dirty="0" err="1"/>
+              <a:t>transparancy</a:t>
+            </a:r>
+            <a:r>
+              <a:rPr lang="de-DE" dirty="0"/>
+              <a:t>. </a:t>
+            </a:r>
+            <a:r>
+              <a:rPr lang="de-DE" dirty="0" err="1"/>
+              <a:t>Additionally</a:t>
+            </a:r>
+            <a:r>
+              <a:rPr lang="de-DE" dirty="0"/>
+              <a:t>, </a:t>
+            </a:r>
+            <a:r>
+              <a:rPr lang="de-DE" dirty="0" err="1"/>
+              <a:t>the</a:t>
+            </a:r>
+            <a:r>
+              <a:rPr lang="de-DE" dirty="0"/>
+              <a:t> </a:t>
+            </a:r>
+            <a:r>
+              <a:rPr lang="de-DE" dirty="0" err="1"/>
+              <a:t>implementation</a:t>
+            </a:r>
+            <a:r>
+              <a:rPr lang="de-DE" dirty="0"/>
+              <a:t> </a:t>
+            </a:r>
+            <a:r>
+              <a:rPr lang="de-DE" dirty="0" err="1"/>
+              <a:t>of</a:t>
+            </a:r>
+            <a:r>
+              <a:rPr lang="de-DE" dirty="0"/>
+              <a:t> smart </a:t>
+            </a:r>
+            <a:r>
+              <a:rPr lang="de-DE" dirty="0" err="1"/>
+              <a:t>contracts</a:t>
+            </a:r>
+            <a:r>
+              <a:rPr lang="de-DE" dirty="0"/>
+              <a:t> </a:t>
+            </a:r>
+            <a:r>
+              <a:rPr lang="de-DE" dirty="0" err="1"/>
+              <a:t>allows</a:t>
+            </a:r>
+            <a:r>
+              <a:rPr lang="de-DE" dirty="0"/>
+              <a:t> </a:t>
+            </a:r>
+            <a:r>
+              <a:rPr lang="de-DE" dirty="0" err="1"/>
+              <a:t>for</a:t>
+            </a:r>
+            <a:r>
+              <a:rPr lang="de-DE" dirty="0"/>
+              <a:t> an </a:t>
+            </a:r>
+            <a:r>
+              <a:rPr lang="de-DE" dirty="0" err="1"/>
+              <a:t>automated</a:t>
+            </a:r>
+            <a:r>
+              <a:rPr lang="de-DE" dirty="0"/>
+              <a:t> </a:t>
+            </a:r>
+            <a:r>
+              <a:rPr lang="de-DE" dirty="0" err="1"/>
+              <a:t>way</a:t>
+            </a:r>
+            <a:r>
+              <a:rPr lang="de-DE" dirty="0"/>
+              <a:t> </a:t>
+            </a:r>
+            <a:r>
+              <a:rPr lang="de-DE" dirty="0" err="1"/>
+              <a:t>of</a:t>
+            </a:r>
+            <a:r>
+              <a:rPr lang="de-DE" dirty="0"/>
+              <a:t> </a:t>
+            </a:r>
+            <a:r>
+              <a:rPr lang="de-DE" dirty="0" err="1"/>
+              <a:t>payment</a:t>
+            </a:r>
+            <a:r>
+              <a:rPr lang="de-DE" dirty="0"/>
+              <a:t>. </a:t>
+            </a:r>
+            <a:r>
+              <a:rPr lang="de-DE" dirty="0" err="1"/>
+              <a:t>Considering</a:t>
+            </a:r>
+            <a:r>
+              <a:rPr lang="de-DE" dirty="0"/>
+              <a:t> </a:t>
+            </a:r>
+            <a:r>
+              <a:rPr lang="de-DE" dirty="0" err="1"/>
+              <a:t>that</a:t>
+            </a:r>
+            <a:r>
+              <a:rPr lang="de-DE" dirty="0"/>
+              <a:t> in </a:t>
+            </a:r>
+            <a:r>
+              <a:rPr lang="de-DE" dirty="0" err="1"/>
+              <a:t>the</a:t>
+            </a:r>
+            <a:r>
+              <a:rPr lang="de-DE" dirty="0"/>
+              <a:t> traditional </a:t>
+            </a:r>
+            <a:r>
+              <a:rPr lang="de-DE" dirty="0" err="1"/>
+              <a:t>insurance</a:t>
+            </a:r>
+            <a:r>
+              <a:rPr lang="de-DE" dirty="0"/>
+              <a:t> </a:t>
+            </a:r>
+            <a:r>
+              <a:rPr lang="de-DE" dirty="0" err="1"/>
+              <a:t>system</a:t>
+            </a:r>
+            <a:r>
+              <a:rPr lang="de-DE" dirty="0"/>
+              <a:t>, </a:t>
+            </a:r>
+            <a:r>
+              <a:rPr lang="de-DE" dirty="0" err="1"/>
+              <a:t>payment</a:t>
+            </a:r>
+            <a:r>
+              <a:rPr lang="de-DE" dirty="0"/>
+              <a:t> </a:t>
+            </a:r>
+            <a:r>
+              <a:rPr lang="de-DE" dirty="0" err="1"/>
+              <a:t>for</a:t>
+            </a:r>
+            <a:r>
+              <a:rPr lang="de-DE" dirty="0"/>
+              <a:t> </a:t>
+            </a:r>
+            <a:r>
+              <a:rPr lang="de-DE" dirty="0" err="1"/>
+              <a:t>claims</a:t>
+            </a:r>
+            <a:r>
+              <a:rPr lang="de-DE" dirty="0"/>
+              <a:t> </a:t>
+            </a:r>
+            <a:r>
+              <a:rPr lang="de-DE" dirty="0" err="1"/>
+              <a:t>take</a:t>
+            </a:r>
+            <a:r>
+              <a:rPr lang="de-DE" dirty="0"/>
+              <a:t> </a:t>
+            </a:r>
+            <a:r>
+              <a:rPr lang="de-DE" dirty="0" err="1"/>
+              <a:t>weeks</a:t>
+            </a:r>
+            <a:r>
+              <a:rPr lang="de-DE" dirty="0"/>
+              <a:t> </a:t>
+            </a:r>
+            <a:r>
+              <a:rPr lang="de-DE" dirty="0" err="1"/>
+              <a:t>or</a:t>
+            </a:r>
+            <a:r>
+              <a:rPr lang="de-DE" dirty="0"/>
+              <a:t> </a:t>
+            </a:r>
+            <a:r>
+              <a:rPr lang="de-DE" dirty="0" err="1"/>
+              <a:t>even</a:t>
+            </a:r>
+            <a:r>
+              <a:rPr lang="de-DE" dirty="0"/>
+              <a:t> </a:t>
+            </a:r>
+            <a:r>
+              <a:rPr lang="de-DE" dirty="0" err="1"/>
+              <a:t>months</a:t>
+            </a:r>
+            <a:r>
+              <a:rPr lang="de-DE" dirty="0"/>
+              <a:t>, an instant, </a:t>
+            </a:r>
+            <a:r>
+              <a:rPr lang="de-DE" dirty="0" err="1"/>
+              <a:t>automated</a:t>
+            </a:r>
+            <a:r>
+              <a:rPr lang="de-DE" dirty="0"/>
+              <a:t> </a:t>
+            </a:r>
+            <a:r>
+              <a:rPr lang="de-DE" dirty="0" err="1"/>
+              <a:t>transaction</a:t>
+            </a:r>
+            <a:r>
+              <a:rPr lang="de-DE" dirty="0"/>
+              <a:t> </a:t>
+            </a:r>
+            <a:r>
+              <a:rPr lang="de-DE" dirty="0" err="1"/>
+              <a:t>would</a:t>
+            </a:r>
+            <a:r>
+              <a:rPr lang="de-DE" dirty="0"/>
+              <a:t> </a:t>
+            </a:r>
+            <a:r>
+              <a:rPr lang="de-DE" dirty="0" err="1"/>
+              <a:t>be</a:t>
+            </a:r>
+            <a:r>
+              <a:rPr lang="de-DE" dirty="0"/>
+              <a:t> a </a:t>
+            </a:r>
+            <a:r>
+              <a:rPr lang="de-DE" dirty="0" err="1"/>
+              <a:t>big</a:t>
+            </a:r>
+            <a:r>
+              <a:rPr lang="de-DE" dirty="0"/>
+              <a:t> </a:t>
+            </a:r>
+            <a:r>
+              <a:rPr lang="de-DE" dirty="0" err="1"/>
+              <a:t>advancement</a:t>
+            </a:r>
+            <a:r>
+              <a:rPr lang="de-DE" dirty="0"/>
+              <a:t>. </a:t>
+            </a:r>
+            <a:r>
+              <a:rPr lang="de-DE" dirty="0" err="1"/>
+              <a:t>Considering</a:t>
+            </a:r>
+            <a:r>
+              <a:rPr lang="de-DE" dirty="0"/>
+              <a:t> </a:t>
+            </a:r>
+            <a:r>
+              <a:rPr lang="de-DE" dirty="0" err="1"/>
+              <a:t>the</a:t>
+            </a:r>
+            <a:r>
+              <a:rPr lang="de-DE" dirty="0"/>
+              <a:t> high initial </a:t>
+            </a:r>
+            <a:r>
+              <a:rPr lang="de-DE" dirty="0" err="1"/>
+              <a:t>investment</a:t>
+            </a:r>
+            <a:r>
+              <a:rPr lang="de-DE" dirty="0"/>
+              <a:t> </a:t>
+            </a:r>
+            <a:r>
+              <a:rPr lang="de-DE" dirty="0" err="1"/>
+              <a:t>cost</a:t>
+            </a:r>
+            <a:r>
+              <a:rPr lang="de-DE" dirty="0"/>
+              <a:t> </a:t>
+            </a:r>
+            <a:r>
+              <a:rPr lang="de-DE" dirty="0" err="1"/>
+              <a:t>to</a:t>
+            </a:r>
+            <a:r>
+              <a:rPr lang="de-DE" dirty="0"/>
+              <a:t> </a:t>
+            </a:r>
+            <a:r>
+              <a:rPr lang="de-DE" dirty="0" err="1"/>
+              <a:t>implement</a:t>
+            </a:r>
+            <a:r>
+              <a:rPr lang="de-DE" dirty="0"/>
+              <a:t> such a </a:t>
+            </a:r>
+            <a:r>
+              <a:rPr lang="de-DE" dirty="0" err="1"/>
+              <a:t>system</a:t>
+            </a:r>
+            <a:r>
+              <a:rPr lang="de-DE" dirty="0"/>
+              <a:t>. </a:t>
+            </a:r>
+          </a:p>
+          <a:p>
+            <a:r>
+              <a:rPr lang="de-DE" dirty="0" err="1"/>
+              <a:t>One</a:t>
+            </a:r>
+            <a:r>
+              <a:rPr lang="de-DE" dirty="0"/>
+              <a:t> </a:t>
+            </a:r>
+            <a:r>
+              <a:rPr lang="de-DE" dirty="0" err="1"/>
+              <a:t>of</a:t>
+            </a:r>
+            <a:r>
+              <a:rPr lang="de-DE" dirty="0"/>
+              <a:t> </a:t>
+            </a:r>
+            <a:r>
+              <a:rPr lang="de-DE" dirty="0" err="1"/>
+              <a:t>the</a:t>
+            </a:r>
+            <a:r>
+              <a:rPr lang="de-DE" dirty="0"/>
+              <a:t> </a:t>
+            </a:r>
+            <a:r>
+              <a:rPr lang="de-DE" dirty="0" err="1"/>
+              <a:t>first</a:t>
+            </a:r>
+            <a:r>
+              <a:rPr lang="de-DE" dirty="0"/>
+              <a:t> </a:t>
+            </a:r>
+            <a:r>
+              <a:rPr lang="de-DE" dirty="0" err="1"/>
+              <a:t>implementations</a:t>
+            </a:r>
+            <a:r>
+              <a:rPr lang="de-DE" dirty="0"/>
+              <a:t> in </a:t>
+            </a:r>
+            <a:r>
+              <a:rPr lang="de-DE" dirty="0" err="1"/>
+              <a:t>the</a:t>
+            </a:r>
+            <a:r>
+              <a:rPr lang="de-DE" dirty="0"/>
+              <a:t> </a:t>
+            </a:r>
+            <a:r>
+              <a:rPr lang="de-DE" dirty="0" err="1"/>
+              <a:t>insurance</a:t>
+            </a:r>
+            <a:r>
+              <a:rPr lang="de-DE" dirty="0"/>
+              <a:t> </a:t>
+            </a:r>
+            <a:r>
+              <a:rPr lang="de-DE" dirty="0" err="1"/>
+              <a:t>sector</a:t>
+            </a:r>
+            <a:r>
+              <a:rPr lang="de-DE" dirty="0"/>
+              <a:t> </a:t>
+            </a:r>
+            <a:r>
+              <a:rPr lang="de-DE" dirty="0" err="1"/>
+              <a:t>are</a:t>
+            </a:r>
+            <a:r>
+              <a:rPr lang="de-DE" dirty="0"/>
+              <a:t> </a:t>
+            </a:r>
+            <a:r>
+              <a:rPr lang="de-DE" dirty="0" err="1"/>
+              <a:t>going</a:t>
+            </a:r>
+            <a:r>
+              <a:rPr lang="de-DE" dirty="0"/>
+              <a:t> </a:t>
+            </a:r>
+            <a:r>
+              <a:rPr lang="de-DE" dirty="0" err="1"/>
+              <a:t>to</a:t>
+            </a:r>
+            <a:r>
+              <a:rPr lang="de-DE" dirty="0"/>
+              <a:t> </a:t>
+            </a:r>
+            <a:r>
+              <a:rPr lang="de-DE" dirty="0" err="1"/>
+              <a:t>market</a:t>
+            </a:r>
+            <a:r>
+              <a:rPr lang="de-DE" dirty="0"/>
+              <a:t> in </a:t>
+            </a:r>
+            <a:r>
+              <a:rPr lang="de-DE" dirty="0" err="1"/>
+              <a:t>the</a:t>
+            </a:r>
+            <a:r>
+              <a:rPr lang="de-DE" dirty="0"/>
+              <a:t> </a:t>
+            </a:r>
+            <a:r>
+              <a:rPr lang="de-DE" dirty="0" err="1"/>
+              <a:t>beginning</a:t>
+            </a:r>
+            <a:r>
+              <a:rPr lang="de-DE" dirty="0"/>
+              <a:t> </a:t>
+            </a:r>
+            <a:r>
+              <a:rPr lang="de-DE" dirty="0" err="1"/>
+              <a:t>of</a:t>
+            </a:r>
+            <a:r>
+              <a:rPr lang="de-DE" dirty="0"/>
+              <a:t> 2020. </a:t>
+            </a:r>
+            <a:r>
+              <a:rPr lang="de-DE" i="1" dirty="0"/>
+              <a:t>B3i</a:t>
+            </a:r>
+            <a:r>
+              <a:rPr lang="de-DE" dirty="0"/>
+              <a:t> </a:t>
+            </a:r>
+            <a:r>
+              <a:rPr lang="de-DE" dirty="0" err="1"/>
+              <a:t>is</a:t>
+            </a:r>
+            <a:r>
+              <a:rPr lang="de-DE" dirty="0"/>
+              <a:t> </a:t>
+            </a:r>
+            <a:r>
+              <a:rPr lang="de-DE" dirty="0" err="1"/>
+              <a:t>building</a:t>
+            </a:r>
+            <a:r>
+              <a:rPr lang="de-DE" dirty="0"/>
+              <a:t> a </a:t>
+            </a:r>
+            <a:r>
+              <a:rPr lang="de-DE" dirty="0" err="1"/>
+              <a:t>platform</a:t>
+            </a:r>
+            <a:r>
+              <a:rPr lang="de-DE" dirty="0"/>
+              <a:t> on </a:t>
+            </a:r>
+            <a:r>
+              <a:rPr lang="de-DE" dirty="0" err="1"/>
+              <a:t>distributed</a:t>
+            </a:r>
+            <a:r>
+              <a:rPr lang="de-DE" dirty="0"/>
+              <a:t> </a:t>
+            </a:r>
+            <a:r>
+              <a:rPr lang="de-DE" dirty="0" err="1"/>
+              <a:t>ledger</a:t>
+            </a:r>
+            <a:r>
+              <a:rPr lang="de-DE" dirty="0"/>
+              <a:t> </a:t>
+            </a:r>
+            <a:r>
+              <a:rPr lang="de-DE" dirty="0" err="1"/>
+              <a:t>technology</a:t>
+            </a:r>
+            <a:r>
+              <a:rPr lang="de-DE" dirty="0"/>
+              <a:t> </a:t>
+            </a:r>
+            <a:r>
+              <a:rPr lang="de-DE" dirty="0" err="1"/>
+              <a:t>to</a:t>
+            </a:r>
+            <a:r>
+              <a:rPr lang="de-DE" dirty="0"/>
+              <a:t> </a:t>
+            </a:r>
+            <a:r>
+              <a:rPr lang="de-DE" dirty="0" err="1"/>
+              <a:t>create</a:t>
+            </a:r>
+            <a:r>
+              <a:rPr lang="de-DE" dirty="0"/>
+              <a:t> a </a:t>
+            </a:r>
+            <a:r>
+              <a:rPr lang="de-DE" i="1" dirty="0"/>
+              <a:t>"</a:t>
+            </a:r>
+            <a:r>
+              <a:rPr lang="de-DE" i="1" dirty="0" err="1"/>
+              <a:t>single</a:t>
+            </a:r>
+            <a:r>
+              <a:rPr lang="de-DE" i="1" dirty="0"/>
+              <a:t> </a:t>
+            </a:r>
+            <a:r>
+              <a:rPr lang="de-DE" i="1" dirty="0" err="1"/>
+              <a:t>source</a:t>
+            </a:r>
+            <a:r>
+              <a:rPr lang="de-DE" i="1" dirty="0"/>
+              <a:t> </a:t>
+            </a:r>
+            <a:r>
+              <a:rPr lang="de-DE" i="1" dirty="0" err="1"/>
+              <a:t>of</a:t>
+            </a:r>
+            <a:r>
+              <a:rPr lang="de-DE" i="1" dirty="0"/>
+              <a:t> </a:t>
+            </a:r>
+            <a:r>
+              <a:rPr lang="de-DE" i="1" dirty="0" err="1"/>
+              <a:t>truth</a:t>
+            </a:r>
+            <a:r>
+              <a:rPr lang="de-DE" i="1" dirty="0"/>
+              <a:t>"</a:t>
+            </a:r>
+            <a:r>
+              <a:rPr lang="de-DE" dirty="0"/>
+              <a:t> </a:t>
+            </a:r>
+            <a:r>
+              <a:rPr lang="de-DE" dirty="0" err="1"/>
+              <a:t>opposing</a:t>
+            </a:r>
+            <a:r>
+              <a:rPr lang="de-DE" dirty="0"/>
+              <a:t> </a:t>
+            </a:r>
+            <a:r>
+              <a:rPr lang="de-DE" dirty="0" err="1"/>
+              <a:t>to</a:t>
+            </a:r>
+            <a:r>
+              <a:rPr lang="de-DE" dirty="0"/>
+              <a:t> </a:t>
+            </a:r>
+            <a:r>
+              <a:rPr lang="de-DE" dirty="0" err="1"/>
+              <a:t>decentralized</a:t>
+            </a:r>
+            <a:r>
+              <a:rPr lang="de-DE" dirty="0"/>
+              <a:t> </a:t>
+            </a:r>
+            <a:r>
+              <a:rPr lang="de-DE" dirty="0" err="1"/>
+              <a:t>and</a:t>
+            </a:r>
+            <a:r>
+              <a:rPr lang="de-DE" dirty="0"/>
+              <a:t> </a:t>
+            </a:r>
+            <a:r>
+              <a:rPr lang="de-DE" dirty="0" err="1"/>
+              <a:t>obscure</a:t>
+            </a:r>
+            <a:r>
+              <a:rPr lang="de-DE" dirty="0"/>
+              <a:t> </a:t>
+            </a:r>
+            <a:r>
+              <a:rPr lang="de-DE" dirty="0" err="1"/>
+              <a:t>data</a:t>
+            </a:r>
+            <a:r>
+              <a:rPr lang="de-DE" dirty="0"/>
+              <a:t> </a:t>
+            </a:r>
+            <a:r>
+              <a:rPr lang="de-DE" dirty="0" err="1"/>
+              <a:t>systems</a:t>
+            </a:r>
+            <a:r>
+              <a:rPr lang="de-DE" dirty="0"/>
+              <a:t>. The </a:t>
+            </a:r>
+            <a:r>
+              <a:rPr lang="de-DE" dirty="0" err="1"/>
+              <a:t>ambition</a:t>
+            </a:r>
+            <a:r>
+              <a:rPr lang="de-DE" dirty="0"/>
+              <a:t> </a:t>
+            </a:r>
+            <a:r>
+              <a:rPr lang="de-DE" dirty="0" err="1"/>
+              <a:t>is</a:t>
+            </a:r>
+            <a:r>
+              <a:rPr lang="de-DE" dirty="0"/>
+              <a:t> </a:t>
+            </a:r>
+            <a:r>
+              <a:rPr lang="de-DE" dirty="0" err="1"/>
+              <a:t>to</a:t>
+            </a:r>
+            <a:r>
+              <a:rPr lang="de-DE" dirty="0"/>
+              <a:t> </a:t>
+            </a:r>
+            <a:r>
+              <a:rPr lang="de-DE" dirty="0" err="1"/>
+              <a:t>be</a:t>
+            </a:r>
+            <a:r>
+              <a:rPr lang="de-DE" dirty="0"/>
+              <a:t> </a:t>
+            </a:r>
+            <a:r>
+              <a:rPr lang="de-DE" dirty="0" err="1"/>
+              <a:t>able</a:t>
+            </a:r>
+            <a:r>
+              <a:rPr lang="de-DE" dirty="0"/>
+              <a:t> </a:t>
+            </a:r>
+            <a:r>
+              <a:rPr lang="de-DE" dirty="0" err="1"/>
+              <a:t>to</a:t>
+            </a:r>
+            <a:r>
+              <a:rPr lang="de-DE" dirty="0"/>
+              <a:t> </a:t>
+            </a:r>
+            <a:r>
+              <a:rPr lang="de-DE" dirty="0" err="1"/>
+              <a:t>optimise</a:t>
+            </a:r>
+            <a:r>
+              <a:rPr lang="de-DE" dirty="0"/>
+              <a:t> </a:t>
+            </a:r>
+            <a:r>
+              <a:rPr lang="de-DE" dirty="0" err="1"/>
+              <a:t>the</a:t>
+            </a:r>
+            <a:r>
+              <a:rPr lang="de-DE" dirty="0"/>
+              <a:t> </a:t>
+            </a:r>
+            <a:r>
+              <a:rPr lang="de-DE" dirty="0" err="1"/>
+              <a:t>processes</a:t>
+            </a:r>
+            <a:r>
+              <a:rPr lang="de-DE" dirty="0"/>
+              <a:t> in </a:t>
+            </a:r>
+            <a:r>
+              <a:rPr lang="de-DE" dirty="0" err="1"/>
+              <a:t>the</a:t>
+            </a:r>
+            <a:r>
+              <a:rPr lang="de-DE" dirty="0"/>
+              <a:t> </a:t>
+            </a:r>
+            <a:r>
+              <a:rPr lang="de-DE" dirty="0" err="1"/>
+              <a:t>market</a:t>
+            </a:r>
+            <a:r>
+              <a:rPr lang="de-DE" dirty="0"/>
+              <a:t> </a:t>
+            </a:r>
+            <a:r>
+              <a:rPr lang="de-DE" dirty="0" err="1"/>
+              <a:t>and</a:t>
+            </a:r>
+            <a:r>
+              <a:rPr lang="de-DE" dirty="0"/>
+              <a:t> </a:t>
+            </a:r>
+            <a:r>
+              <a:rPr lang="de-DE" dirty="0" err="1"/>
+              <a:t>reduce</a:t>
+            </a:r>
+            <a:r>
+              <a:rPr lang="de-DE" dirty="0"/>
+              <a:t> </a:t>
+            </a:r>
+            <a:r>
+              <a:rPr lang="de-DE" dirty="0" err="1"/>
+              <a:t>the</a:t>
+            </a:r>
+            <a:r>
+              <a:rPr lang="de-DE" dirty="0"/>
+              <a:t> </a:t>
+            </a:r>
+            <a:r>
+              <a:rPr lang="de-DE" dirty="0" err="1"/>
+              <a:t>costs</a:t>
+            </a:r>
+            <a:r>
+              <a:rPr lang="de-DE" dirty="0"/>
+              <a:t> </a:t>
+            </a:r>
+            <a:r>
+              <a:rPr lang="de-DE" dirty="0" err="1"/>
+              <a:t>significantly</a:t>
+            </a:r>
+            <a:r>
+              <a:rPr lang="de-DE" dirty="0"/>
+              <a:t>. </a:t>
+            </a:r>
+          </a:p>
+          <a:p>
+            <a:r>
+              <a:rPr lang="de-DE" dirty="0"/>
+              <a:t>B3i's </a:t>
+            </a:r>
+            <a:r>
+              <a:rPr lang="de-DE" dirty="0" err="1"/>
+              <a:t>concept</a:t>
+            </a:r>
+            <a:r>
+              <a:rPr lang="de-DE" dirty="0"/>
+              <a:t> </a:t>
+            </a:r>
+            <a:r>
+              <a:rPr lang="de-DE" dirty="0" err="1"/>
+              <a:t>is</a:t>
+            </a:r>
+            <a:r>
+              <a:rPr lang="de-DE" dirty="0"/>
+              <a:t> </a:t>
+            </a:r>
+            <a:r>
+              <a:rPr lang="de-DE" dirty="0" err="1"/>
+              <a:t>that</a:t>
+            </a:r>
+            <a:r>
+              <a:rPr lang="de-DE" dirty="0"/>
+              <a:t> </a:t>
+            </a:r>
+            <a:r>
+              <a:rPr lang="de-DE" dirty="0" err="1"/>
+              <a:t>every</a:t>
+            </a:r>
+            <a:r>
+              <a:rPr lang="de-DE" dirty="0"/>
+              <a:t> </a:t>
+            </a:r>
+            <a:r>
+              <a:rPr lang="de-DE" dirty="0" err="1"/>
+              <a:t>node</a:t>
+            </a:r>
+            <a:r>
+              <a:rPr lang="de-DE" dirty="0"/>
+              <a:t> </a:t>
+            </a:r>
+            <a:r>
+              <a:rPr lang="de-DE" dirty="0" err="1"/>
+              <a:t>processes</a:t>
+            </a:r>
+            <a:r>
+              <a:rPr lang="de-DE" dirty="0"/>
+              <a:t> </a:t>
+            </a:r>
+            <a:r>
+              <a:rPr lang="de-DE" dirty="0" err="1"/>
+              <a:t>and</a:t>
+            </a:r>
+            <a:r>
+              <a:rPr lang="de-DE" dirty="0"/>
+              <a:t> </a:t>
+            </a:r>
+            <a:r>
+              <a:rPr lang="de-DE" dirty="0" err="1"/>
+              <a:t>verifies</a:t>
+            </a:r>
+            <a:r>
+              <a:rPr lang="de-DE" dirty="0"/>
+              <a:t> </a:t>
+            </a:r>
+            <a:r>
+              <a:rPr lang="de-DE" dirty="0" err="1"/>
+              <a:t>each</a:t>
+            </a:r>
+            <a:r>
+              <a:rPr lang="de-DE" dirty="0"/>
+              <a:t> </a:t>
+            </a:r>
+            <a:r>
+              <a:rPr lang="de-DE" dirty="0" err="1"/>
+              <a:t>activity</a:t>
+            </a:r>
+            <a:r>
+              <a:rPr lang="de-DE" dirty="0"/>
+              <a:t>. In </a:t>
+            </a:r>
+            <a:r>
+              <a:rPr lang="de-DE" dirty="0" err="1"/>
+              <a:t>this</a:t>
+            </a:r>
+            <a:r>
+              <a:rPr lang="de-DE" dirty="0"/>
+              <a:t> </a:t>
+            </a:r>
+            <a:r>
+              <a:rPr lang="de-DE" dirty="0" err="1"/>
+              <a:t>way</a:t>
+            </a:r>
+            <a:r>
+              <a:rPr lang="de-DE" dirty="0"/>
+              <a:t>, </a:t>
+            </a:r>
+            <a:r>
+              <a:rPr lang="de-DE" dirty="0" err="1"/>
+              <a:t>there</a:t>
+            </a:r>
+            <a:r>
+              <a:rPr lang="de-DE" dirty="0"/>
+              <a:t> </a:t>
+            </a:r>
+            <a:r>
+              <a:rPr lang="de-DE" dirty="0" err="1"/>
+              <a:t>exisits</a:t>
+            </a:r>
+            <a:r>
+              <a:rPr lang="de-DE" dirty="0"/>
+              <a:t> a </a:t>
+            </a:r>
+            <a:r>
+              <a:rPr lang="de-DE" dirty="0" err="1"/>
+              <a:t>common</a:t>
+            </a:r>
+            <a:r>
+              <a:rPr lang="de-DE" dirty="0"/>
+              <a:t> </a:t>
+            </a:r>
+            <a:r>
+              <a:rPr lang="de-DE" dirty="0" err="1"/>
+              <a:t>consensus</a:t>
+            </a:r>
+            <a:r>
+              <a:rPr lang="de-DE" dirty="0"/>
+              <a:t> </a:t>
+            </a:r>
+            <a:r>
+              <a:rPr lang="de-DE" dirty="0" err="1"/>
+              <a:t>about</a:t>
+            </a:r>
+            <a:r>
+              <a:rPr lang="de-DE" dirty="0"/>
+              <a:t> </a:t>
+            </a:r>
+            <a:r>
+              <a:rPr lang="de-DE" dirty="0" err="1"/>
+              <a:t>the</a:t>
+            </a:r>
+            <a:r>
+              <a:rPr lang="de-DE" dirty="0"/>
+              <a:t> </a:t>
+            </a:r>
+            <a:r>
+              <a:rPr lang="de-DE" dirty="0" err="1"/>
+              <a:t>validity</a:t>
+            </a:r>
+            <a:r>
+              <a:rPr lang="de-DE" dirty="0"/>
+              <a:t> </a:t>
+            </a:r>
+            <a:r>
+              <a:rPr lang="de-DE" dirty="0" err="1"/>
+              <a:t>of</a:t>
+            </a:r>
+            <a:r>
+              <a:rPr lang="de-DE" dirty="0"/>
+              <a:t> a </a:t>
+            </a:r>
+            <a:r>
+              <a:rPr lang="de-DE" dirty="0" err="1"/>
+              <a:t>transaction</a:t>
+            </a:r>
+            <a:r>
+              <a:rPr lang="de-DE" dirty="0"/>
+              <a:t>. Through smart </a:t>
+            </a:r>
+            <a:r>
+              <a:rPr lang="de-DE" dirty="0" err="1"/>
+              <a:t>contracting</a:t>
+            </a:r>
+            <a:r>
+              <a:rPr lang="de-DE" dirty="0"/>
+              <a:t> </a:t>
+            </a:r>
+            <a:r>
+              <a:rPr lang="de-DE" dirty="0" err="1"/>
+              <a:t>asset</a:t>
+            </a:r>
+            <a:r>
+              <a:rPr lang="de-DE" dirty="0"/>
+              <a:t> </a:t>
+            </a:r>
+            <a:r>
+              <a:rPr lang="de-DE" dirty="0" err="1"/>
+              <a:t>transfers</a:t>
+            </a:r>
+            <a:r>
+              <a:rPr lang="de-DE" dirty="0"/>
+              <a:t> </a:t>
+            </a:r>
+            <a:r>
+              <a:rPr lang="de-DE" dirty="0" err="1"/>
+              <a:t>are</a:t>
+            </a:r>
+            <a:r>
+              <a:rPr lang="de-DE" dirty="0"/>
+              <a:t> </a:t>
+            </a:r>
+            <a:r>
+              <a:rPr lang="de-DE" dirty="0" err="1"/>
+              <a:t>automatically</a:t>
+            </a:r>
+            <a:r>
+              <a:rPr lang="de-DE" dirty="0"/>
+              <a:t> </a:t>
+            </a:r>
+            <a:r>
+              <a:rPr lang="de-DE" dirty="0" err="1"/>
+              <a:t>validated</a:t>
+            </a:r>
+            <a:r>
+              <a:rPr lang="de-DE" dirty="0"/>
+              <a:t> </a:t>
+            </a:r>
+            <a:r>
+              <a:rPr lang="de-DE" dirty="0" err="1"/>
+              <a:t>and</a:t>
+            </a:r>
+            <a:r>
+              <a:rPr lang="de-DE" dirty="0"/>
+              <a:t> </a:t>
+            </a:r>
+            <a:r>
+              <a:rPr lang="de-DE" dirty="0" err="1"/>
+              <a:t>enforced</a:t>
+            </a:r>
+            <a:r>
+              <a:rPr lang="de-DE" dirty="0"/>
+              <a:t>, </a:t>
+            </a:r>
+            <a:r>
+              <a:rPr lang="de-DE" dirty="0" err="1"/>
+              <a:t>while</a:t>
+            </a:r>
+            <a:r>
+              <a:rPr lang="de-DE" dirty="0"/>
+              <a:t> </a:t>
+            </a:r>
+            <a:r>
+              <a:rPr lang="de-DE" dirty="0" err="1"/>
+              <a:t>they</a:t>
+            </a:r>
+            <a:r>
+              <a:rPr lang="de-DE" dirty="0"/>
+              <a:t> </a:t>
+            </a:r>
+            <a:r>
+              <a:rPr lang="de-DE" dirty="0" err="1"/>
+              <a:t>ensure</a:t>
+            </a:r>
+            <a:r>
+              <a:rPr lang="de-DE" dirty="0"/>
+              <a:t> </a:t>
+            </a:r>
+            <a:r>
+              <a:rPr lang="de-DE" dirty="0" err="1"/>
+              <a:t>that</a:t>
+            </a:r>
+            <a:r>
+              <a:rPr lang="de-DE" dirty="0"/>
+              <a:t> </a:t>
+            </a:r>
+            <a:r>
+              <a:rPr lang="de-DE" dirty="0" err="1"/>
+              <a:t>only</a:t>
+            </a:r>
+            <a:r>
+              <a:rPr lang="de-DE" dirty="0"/>
+              <a:t> </a:t>
+            </a:r>
+            <a:r>
+              <a:rPr lang="de-DE" dirty="0" err="1"/>
+              <a:t>the</a:t>
+            </a:r>
+            <a:r>
+              <a:rPr lang="de-DE" dirty="0"/>
+              <a:t> </a:t>
+            </a:r>
+            <a:r>
+              <a:rPr lang="de-DE" dirty="0" err="1"/>
+              <a:t>nodes</a:t>
+            </a:r>
+            <a:r>
+              <a:rPr lang="de-DE" dirty="0"/>
+              <a:t> </a:t>
+            </a:r>
+            <a:r>
+              <a:rPr lang="de-DE" dirty="0" err="1"/>
+              <a:t>involved</a:t>
+            </a:r>
+            <a:r>
+              <a:rPr lang="de-DE" dirty="0"/>
+              <a:t> in </a:t>
+            </a:r>
+            <a:r>
+              <a:rPr lang="de-DE" dirty="0" err="1"/>
+              <a:t>the</a:t>
+            </a:r>
+            <a:r>
+              <a:rPr lang="de-DE" dirty="0"/>
+              <a:t> </a:t>
+            </a:r>
+            <a:r>
+              <a:rPr lang="de-DE" dirty="0" err="1"/>
+              <a:t>transaction</a:t>
+            </a:r>
+            <a:r>
+              <a:rPr lang="de-DE" dirty="0"/>
+              <a:t> </a:t>
+            </a:r>
+            <a:r>
+              <a:rPr lang="de-DE" dirty="0" err="1"/>
+              <a:t>can</a:t>
+            </a:r>
+            <a:r>
+              <a:rPr lang="de-DE" dirty="0"/>
+              <a:t> </a:t>
+            </a:r>
+            <a:r>
+              <a:rPr lang="de-DE" dirty="0" err="1"/>
+              <a:t>access</a:t>
+            </a:r>
+            <a:r>
+              <a:rPr lang="de-DE" dirty="0"/>
+              <a:t> </a:t>
+            </a:r>
+            <a:r>
+              <a:rPr lang="de-DE" dirty="0" err="1"/>
+              <a:t>the</a:t>
+            </a:r>
+            <a:r>
+              <a:rPr lang="de-DE" dirty="0"/>
+              <a:t> </a:t>
+            </a:r>
+            <a:r>
+              <a:rPr lang="de-DE" dirty="0" err="1"/>
+              <a:t>information</a:t>
+            </a:r>
+            <a:r>
+              <a:rPr lang="de-DE" dirty="0"/>
+              <a:t>. </a:t>
+            </a:r>
+            <a:endParaRPr lang="en-US" dirty="0"/>
           </a:p>
         </p:txBody>
       </p:sp>

</xml_diff>